<commit_message>
Updated by adding more
</commit_message>
<xml_diff>
--- a/Foodr.pptx
+++ b/Foodr.pptx
@@ -169,7 +169,7 @@
 <file path=ppt/revisionInfo.xml><?xml version="1.0" encoding="utf-8"?>
 <p1510:revInfo xmlns:a="http://schemas.openxmlformats.org/drawingml/2006/main" xmlns:r="http://schemas.openxmlformats.org/officeDocument/2006/relationships" xmlns:p1510="http://schemas.microsoft.com/office/powerpoint/2015/10/main">
   <p1510:revLst>
-    <p1510:client id="{2B1498EB-649C-4D83-8AC6-46A54FA36257}" v="20" dt="2019-11-26T22:42:22.899"/>
+    <p1510:client id="{2B1498EB-649C-4D83-8AC6-46A54FA36257}" v="55" dt="2019-11-26T23:34:53.331"/>
   </p1510:revLst>
 </p1510:revInfo>
 </file>
@@ -296,6 +296,142 @@
       </pc:sldChg>
     </pc:docChg>
   </pc:docChgLst>
+  <pc:docChgLst>
+    <pc:chgData name="david@eyvus.com" userId="0589f44dc4b0d853" providerId="LiveId" clId="{2B1498EB-649C-4D83-8AC6-46A54FA36257}"/>
+    <pc:docChg chg="modSld">
+      <pc:chgData name="david@eyvus.com" userId="0589f44dc4b0d853" providerId="LiveId" clId="{2B1498EB-649C-4D83-8AC6-46A54FA36257}" dt="2019-11-26T23:38:00.924" v="306" actId="114"/>
+      <pc:docMkLst>
+        <pc:docMk/>
+      </pc:docMkLst>
+      <pc:sldChg chg="addSp modSp">
+        <pc:chgData name="david@eyvus.com" userId="0589f44dc4b0d853" providerId="LiveId" clId="{2B1498EB-649C-4D83-8AC6-46A54FA36257}" dt="2019-11-26T23:38:00.924" v="306" actId="114"/>
+        <pc:sldMkLst>
+          <pc:docMk/>
+          <pc:sldMk cId="0" sldId="257"/>
+        </pc:sldMkLst>
+        <pc:spChg chg="mod">
+          <ac:chgData name="david@eyvus.com" userId="0589f44dc4b0d853" providerId="LiveId" clId="{2B1498EB-649C-4D83-8AC6-46A54FA36257}" dt="2019-11-26T23:37:26.226" v="301" actId="2711"/>
+          <ac:spMkLst>
+            <pc:docMk/>
+            <pc:sldMk cId="0" sldId="257"/>
+            <ac:spMk id="2" creationId="{FE7894FC-DB6A-4CB3-9910-05846D81050F}"/>
+          </ac:spMkLst>
+        </pc:spChg>
+        <pc:spChg chg="add mod">
+          <ac:chgData name="david@eyvus.com" userId="0589f44dc4b0d853" providerId="LiveId" clId="{2B1498EB-649C-4D83-8AC6-46A54FA36257}" dt="2019-11-26T23:37:15.366" v="299" actId="2711"/>
+          <ac:spMkLst>
+            <pc:docMk/>
+            <pc:sldMk cId="0" sldId="257"/>
+            <ac:spMk id="4" creationId="{FE107523-344D-4CC6-99AE-552B1D7D0F47}"/>
+          </ac:spMkLst>
+        </pc:spChg>
+        <pc:spChg chg="mod">
+          <ac:chgData name="david@eyvus.com" userId="0589f44dc4b0d853" providerId="LiveId" clId="{2B1498EB-649C-4D83-8AC6-46A54FA36257}" dt="2019-11-26T23:34:53.331" v="247" actId="207"/>
+          <ac:spMkLst>
+            <pc:docMk/>
+            <pc:sldMk cId="0" sldId="257"/>
+            <ac:spMk id="5" creationId="{76A59351-224F-4610-863E-E4CAEFF46315}"/>
+          </ac:spMkLst>
+        </pc:spChg>
+        <pc:spChg chg="add mod">
+          <ac:chgData name="david@eyvus.com" userId="0589f44dc4b0d853" providerId="LiveId" clId="{2B1498EB-649C-4D83-8AC6-46A54FA36257}" dt="2019-11-26T23:37:10.269" v="298" actId="2711"/>
+          <ac:spMkLst>
+            <pc:docMk/>
+            <pc:sldMk cId="0" sldId="257"/>
+            <ac:spMk id="6" creationId="{1CA6971E-0BAC-451A-B0EC-A771D9D2C3A9}"/>
+          </ac:spMkLst>
+        </pc:spChg>
+        <pc:spChg chg="add mod">
+          <ac:chgData name="david@eyvus.com" userId="0589f44dc4b0d853" providerId="LiveId" clId="{2B1498EB-649C-4D83-8AC6-46A54FA36257}" dt="2019-11-26T23:37:20.686" v="300" actId="2711"/>
+          <ac:spMkLst>
+            <pc:docMk/>
+            <pc:sldMk cId="0" sldId="257"/>
+            <ac:spMk id="8" creationId="{10E0A40C-4888-4D02-87CC-021F953A68D2}"/>
+          </ac:spMkLst>
+        </pc:spChg>
+        <pc:spChg chg="add mod">
+          <ac:chgData name="david@eyvus.com" userId="0589f44dc4b0d853" providerId="LiveId" clId="{2B1498EB-649C-4D83-8AC6-46A54FA36257}" dt="2019-11-26T23:36:56.777" v="297" actId="113"/>
+          <ac:spMkLst>
+            <pc:docMk/>
+            <pc:sldMk cId="0" sldId="257"/>
+            <ac:spMk id="9" creationId="{0C0F8221-3E50-4B1D-ADC6-7E48E320A8DA}"/>
+          </ac:spMkLst>
+        </pc:spChg>
+        <pc:spChg chg="mod">
+          <ac:chgData name="david@eyvus.com" userId="0589f44dc4b0d853" providerId="LiveId" clId="{2B1498EB-649C-4D83-8AC6-46A54FA36257}" dt="2019-11-26T23:37:40.892" v="303" actId="2711"/>
+          <ac:spMkLst>
+            <pc:docMk/>
+            <pc:sldMk cId="0" sldId="257"/>
+            <ac:spMk id="11" creationId="{0605094E-9438-4F2B-BE63-B3F3D7783FA0}"/>
+          </ac:spMkLst>
+        </pc:spChg>
+        <pc:spChg chg="mod">
+          <ac:chgData name="david@eyvus.com" userId="0589f44dc4b0d853" providerId="LiveId" clId="{2B1498EB-649C-4D83-8AC6-46A54FA36257}" dt="2019-11-26T23:34:53.331" v="247" actId="207"/>
+          <ac:spMkLst>
+            <pc:docMk/>
+            <pc:sldMk cId="0" sldId="257"/>
+            <ac:spMk id="16" creationId="{845C1C74-DFAB-4D0D-9D96-B459259CBE38}"/>
+          </ac:spMkLst>
+        </pc:spChg>
+        <pc:spChg chg="mod">
+          <ac:chgData name="david@eyvus.com" userId="0589f44dc4b0d853" providerId="LiveId" clId="{2B1498EB-649C-4D83-8AC6-46A54FA36257}" dt="2019-11-26T23:37:47.213" v="304" actId="1076"/>
+          <ac:spMkLst>
+            <pc:docMk/>
+            <pc:sldMk cId="0" sldId="257"/>
+            <ac:spMk id="19" creationId="{FEE6FFA3-E93F-409B-B9E7-FFA8937A7FE4}"/>
+          </ac:spMkLst>
+        </pc:spChg>
+        <pc:spChg chg="mod">
+          <ac:chgData name="david@eyvus.com" userId="0589f44dc4b0d853" providerId="LiveId" clId="{2B1498EB-649C-4D83-8AC6-46A54FA36257}" dt="2019-11-26T23:38:00.924" v="306" actId="114"/>
+          <ac:spMkLst>
+            <pc:docMk/>
+            <pc:sldMk cId="0" sldId="257"/>
+            <ac:spMk id="3077" creationId="{00000000-0000-0000-0000-000000000000}"/>
+          </ac:spMkLst>
+        </pc:spChg>
+        <pc:spChg chg="mod">
+          <ac:chgData name="david@eyvus.com" userId="0589f44dc4b0d853" providerId="LiveId" clId="{2B1498EB-649C-4D83-8AC6-46A54FA36257}" dt="2019-11-26T23:34:53.331" v="247" actId="207"/>
+          <ac:spMkLst>
+            <pc:docMk/>
+            <pc:sldMk cId="0" sldId="257"/>
+            <ac:spMk id="3397" creationId="{00000000-0000-0000-0000-000000000000}"/>
+          </ac:spMkLst>
+        </pc:spChg>
+        <pc:picChg chg="mod">
+          <ac:chgData name="david@eyvus.com" userId="0589f44dc4b0d853" providerId="LiveId" clId="{2B1498EB-649C-4D83-8AC6-46A54FA36257}" dt="2019-11-26T23:34:53.331" v="247" actId="207"/>
+          <ac:picMkLst>
+            <pc:docMk/>
+            <pc:sldMk cId="0" sldId="257"/>
+            <ac:picMk id="3" creationId="{00000000-0000-0000-0000-000000000000}"/>
+          </ac:picMkLst>
+        </pc:picChg>
+        <pc:picChg chg="mod">
+          <ac:chgData name="david@eyvus.com" userId="0589f44dc4b0d853" providerId="LiveId" clId="{2B1498EB-649C-4D83-8AC6-46A54FA36257}" dt="2019-11-26T23:34:53.331" v="247" actId="207"/>
+          <ac:picMkLst>
+            <pc:docMk/>
+            <pc:sldMk cId="0" sldId="257"/>
+            <ac:picMk id="7" creationId="{FEE4D94B-0CC8-4810-BC55-740A75748980}"/>
+          </ac:picMkLst>
+        </pc:picChg>
+        <pc:picChg chg="mod">
+          <ac:chgData name="david@eyvus.com" userId="0589f44dc4b0d853" providerId="LiveId" clId="{2B1498EB-649C-4D83-8AC6-46A54FA36257}" dt="2019-11-26T23:34:53.331" v="247" actId="207"/>
+          <ac:picMkLst>
+            <pc:docMk/>
+            <pc:sldMk cId="0" sldId="257"/>
+            <ac:picMk id="13" creationId="{AA3BCF8E-7A9E-43DB-AF24-04C5F1261F21}"/>
+          </ac:picMkLst>
+        </pc:picChg>
+        <pc:picChg chg="mod">
+          <ac:chgData name="david@eyvus.com" userId="0589f44dc4b0d853" providerId="LiveId" clId="{2B1498EB-649C-4D83-8AC6-46A54FA36257}" dt="2019-11-26T23:34:53.331" v="247" actId="207"/>
+          <ac:picMkLst>
+            <pc:docMk/>
+            <pc:sldMk cId="0" sldId="257"/>
+            <ac:picMk id="18" creationId="{5BE7CAE4-EAAE-4234-8338-80FA0D2E4C1D}"/>
+          </ac:picMkLst>
+        </pc:picChg>
+      </pc:sldChg>
+    </pc:docChg>
+  </pc:docChgLst>
 </pc:chgInfo>
 </file>
 
@@ -398,7 +534,7 @@
               <a:pPr>
                 <a:defRPr/>
               </a:pPr>
-              <a:t>11/25/2019</a:t>
+              <a:t>11/26/2019</a:t>
             </a:fld>
             <a:endParaRPr lang="en-US" altLang="en-US"/>
           </a:p>
@@ -4401,9 +4537,6 @@
               <a:ln>
                 <a:noFill/>
               </a:ln>
-              <a:solidFill>
-                <a:schemeClr val="tx1"/>
-              </a:solidFill>
               <a:effectLst/>
               <a:latin typeface="Arial" charset="0"/>
             </a:endParaRPr>
@@ -4420,8 +4553,8 @@
         </p:nvSpPr>
         <p:spPr bwMode="auto">
           <a:xfrm>
-            <a:off x="7156175" y="834718"/>
-            <a:ext cx="31936083" cy="2681073"/>
+            <a:off x="6625258" y="988017"/>
+            <a:ext cx="31936083" cy="1573078"/>
           </a:xfrm>
           <a:prstGeom prst="rect">
             <a:avLst/>
@@ -4594,117 +4727,16 @@
               <a:buNone/>
             </a:pPr>
             <a:r>
-              <a:rPr lang="en-US" altLang="ko-KR" sz="9600" b="1" dirty="0" err="1">
-                <a:solidFill>
-                  <a:schemeClr val="bg1"/>
-                </a:solidFill>
+              <a:rPr lang="en-US" altLang="ko-KR" sz="9600" b="1" i="1" dirty="0" err="1">
                 <a:latin typeface="Helvetica" panose="020B0604020202020204" pitchFamily="34" charset="0"/>
                 <a:cs typeface="Helvetica" panose="020B0604020202020204" pitchFamily="34" charset="0"/>
               </a:rPr>
               <a:t>Foodr</a:t>
             </a:r>
-            <a:endParaRPr lang="en-US" altLang="ko-KR" sz="9600" b="1" dirty="0">
-              <a:solidFill>
-                <a:schemeClr val="bg1"/>
-              </a:solidFill>
+            <a:endParaRPr lang="en-US" altLang="ko-KR" sz="9600" b="1" i="1" dirty="0">
               <a:latin typeface="Helvetica" panose="020B0604020202020204" pitchFamily="34" charset="0"/>
               <a:cs typeface="Helvetica" panose="020B0604020202020204" pitchFamily="34" charset="0"/>
             </a:endParaRPr>
-          </a:p>
-          <a:p>
-            <a:pPr algn="ctr" eaLnBrk="1" hangingPunct="1">
-              <a:spcBef>
-                <a:spcPct val="0"/>
-              </a:spcBef>
-              <a:buFontTx/>
-              <a:buNone/>
-            </a:pPr>
-            <a:r>
-              <a:rPr lang="en-US" altLang="ko-KR" sz="3600" dirty="0">
-                <a:solidFill>
-                  <a:schemeClr val="bg1"/>
-                </a:solidFill>
-                <a:latin typeface="Helvetica" panose="020B0604020202020204" pitchFamily="34" charset="0"/>
-                <a:cs typeface="Helvetica" panose="020B0604020202020204" pitchFamily="34" charset="0"/>
-              </a:rPr>
-              <a:t>David Ulriksen, </a:t>
-            </a:r>
-            <a:r>
-              <a:rPr lang="en-US" sz="3600" dirty="0">
-                <a:solidFill>
-                  <a:schemeClr val="bg1"/>
-                </a:solidFill>
-                <a:latin typeface="Helvetica" panose="020B0604020202020204" pitchFamily="34" charset="0"/>
-                <a:cs typeface="Helvetica" panose="020B0604020202020204" pitchFamily="34" charset="0"/>
-              </a:rPr>
-              <a:t>Gregory </a:t>
-            </a:r>
-            <a:r>
-              <a:rPr lang="en-US" sz="3600" dirty="0" err="1">
-                <a:solidFill>
-                  <a:schemeClr val="bg1"/>
-                </a:solidFill>
-                <a:latin typeface="Helvetica" panose="020B0604020202020204" pitchFamily="34" charset="0"/>
-                <a:cs typeface="Helvetica" panose="020B0604020202020204" pitchFamily="34" charset="0"/>
-              </a:rPr>
-              <a:t>Albarian</a:t>
-            </a:r>
-            <a:r>
-              <a:rPr lang="en-US" sz="3600" dirty="0">
-                <a:solidFill>
-                  <a:schemeClr val="bg1"/>
-                </a:solidFill>
-                <a:latin typeface="Helvetica" panose="020B0604020202020204" pitchFamily="34" charset="0"/>
-                <a:cs typeface="Helvetica" panose="020B0604020202020204" pitchFamily="34" charset="0"/>
-              </a:rPr>
-              <a:t>, Alex </a:t>
-            </a:r>
-            <a:r>
-              <a:rPr lang="en-US" sz="3600" dirty="0" err="1">
-                <a:solidFill>
-                  <a:schemeClr val="bg1"/>
-                </a:solidFill>
-                <a:latin typeface="Helvetica" panose="020B0604020202020204" pitchFamily="34" charset="0"/>
-                <a:cs typeface="Helvetica" panose="020B0604020202020204" pitchFamily="34" charset="0"/>
-              </a:rPr>
-              <a:t>Vajiac</a:t>
-            </a:r>
-            <a:r>
-              <a:rPr lang="en-US" sz="3600" dirty="0">
-                <a:solidFill>
-                  <a:schemeClr val="bg1"/>
-                </a:solidFill>
-                <a:latin typeface="Helvetica" panose="020B0604020202020204" pitchFamily="34" charset="0"/>
-                <a:cs typeface="Helvetica" panose="020B0604020202020204" pitchFamily="34" charset="0"/>
-              </a:rPr>
-              <a:t>, Michael Fahy</a:t>
-            </a:r>
-            <a:endParaRPr lang="en-US" altLang="ko-KR" sz="6800" dirty="0">
-              <a:solidFill>
-                <a:schemeClr val="bg1"/>
-              </a:solidFill>
-              <a:latin typeface="Helvetica" panose="020B0604020202020204" pitchFamily="34" charset="0"/>
-              <a:cs typeface="Helvetica" panose="020B0604020202020204" pitchFamily="34" charset="0"/>
-            </a:endParaRPr>
-          </a:p>
-          <a:p>
-            <a:pPr algn="ctr" eaLnBrk="1" hangingPunct="1">
-              <a:spcBef>
-                <a:spcPct val="0"/>
-              </a:spcBef>
-              <a:buFontTx/>
-              <a:buNone/>
-            </a:pPr>
-            <a:r>
-              <a:rPr lang="en-US" altLang="ko-KR" sz="3600" dirty="0">
-                <a:solidFill>
-                  <a:schemeClr val="bg1"/>
-                </a:solidFill>
-                <a:latin typeface="Helvetica" panose="020B0604020202020204" pitchFamily="34" charset="0"/>
-                <a:cs typeface="Helvetica" panose="020B0604020202020204" pitchFamily="34" charset="0"/>
-              </a:rPr>
-              <a:t>Data Communications/Computer Networks: CPSC 353 </a:t>
-            </a:r>
           </a:p>
         </p:txBody>
       </p:sp>
@@ -4862,9 +4894,6 @@
           <a:p>
             <a:r>
               <a:rPr lang="en-US" altLang="en-US" sz="6000" dirty="0">
-                <a:solidFill>
-                  <a:schemeClr val="bg1"/>
-                </a:solidFill>
                 <a:latin typeface="Helvetica" panose="020B0604020202020204" pitchFamily="34" charset="0"/>
               </a:rPr>
               <a:t>When choosing a place to eat, many search the restaurant</a:t>
@@ -4873,9 +4902,6 @@
           <a:p>
             <a:r>
               <a:rPr lang="en-US" altLang="en-US" sz="6000" dirty="0">
-                <a:solidFill>
-                  <a:schemeClr val="bg1"/>
-                </a:solidFill>
                 <a:latin typeface="Helvetica" panose="020B0604020202020204" pitchFamily="34" charset="0"/>
               </a:rPr>
               <a:t>and base their decisions on the rating and reviews it receives.</a:t>
@@ -4883,36 +4909,24 @@
           </a:p>
           <a:p>
             <a:endParaRPr lang="en-US" altLang="en-US" sz="6000" dirty="0">
-              <a:solidFill>
-                <a:schemeClr val="bg1"/>
-              </a:solidFill>
               <a:latin typeface="Helvetica" panose="020B0604020202020204" pitchFamily="34" charset="0"/>
             </a:endParaRPr>
           </a:p>
           <a:p>
             <a:r>
               <a:rPr lang="en-US" altLang="en-US" sz="6000" dirty="0">
-                <a:solidFill>
-                  <a:schemeClr val="bg1"/>
-                </a:solidFill>
                 <a:latin typeface="Helvetica" panose="020B0604020202020204" pitchFamily="34" charset="0"/>
               </a:rPr>
               <a:t>The purpose of </a:t>
             </a:r>
             <a:r>
               <a:rPr lang="en-US" altLang="en-US" sz="6400" b="1" dirty="0" err="1">
-                <a:solidFill>
-                  <a:schemeClr val="bg1"/>
-                </a:solidFill>
                 <a:latin typeface="Helvetica" panose="020B0604020202020204" pitchFamily="34" charset="0"/>
               </a:rPr>
               <a:t>Foodr</a:t>
             </a:r>
             <a:r>
               <a:rPr lang="en-US" altLang="en-US" sz="6000" dirty="0">
-                <a:solidFill>
-                  <a:schemeClr val="bg1"/>
-                </a:solidFill>
                 <a:latin typeface="Helvetica" panose="020B0604020202020204" pitchFamily="34" charset="0"/>
               </a:rPr>
               <a:t> is to do that for you!</a:t>
@@ -4921,9 +4935,6 @@
           <a:p>
             <a:r>
               <a:rPr lang="en-US" altLang="en-US" sz="6000" dirty="0">
-                <a:solidFill>
-                  <a:schemeClr val="bg1"/>
-                </a:solidFill>
                 <a:latin typeface="Helvetica" panose="020B0604020202020204" pitchFamily="34" charset="0"/>
               </a:rPr>
               <a:t>It finds the closest restaurants, and picks the best option</a:t>
@@ -4932,36 +4943,24 @@
           <a:p>
             <a:r>
               <a:rPr lang="en-US" altLang="en-US" sz="6000" dirty="0">
-                <a:solidFill>
-                  <a:schemeClr val="bg1"/>
-                </a:solidFill>
                 <a:latin typeface="Helvetica" panose="020B0604020202020204" pitchFamily="34" charset="0"/>
               </a:rPr>
               <a:t>according to a </a:t>
             </a:r>
             <a:r>
               <a:rPr lang="en-US" altLang="en-US" sz="6200" b="1" dirty="0">
-                <a:solidFill>
-                  <a:schemeClr val="bg1"/>
-                </a:solidFill>
                 <a:latin typeface="Helvetica" panose="020B0604020202020204" pitchFamily="34" charset="0"/>
               </a:rPr>
               <a:t>Smart Score</a:t>
             </a:r>
             <a:r>
               <a:rPr lang="en-US" altLang="en-US" sz="6000" b="1" dirty="0">
-                <a:solidFill>
-                  <a:schemeClr val="bg1"/>
-                </a:solidFill>
                 <a:latin typeface="Helvetica" panose="020B0604020202020204" pitchFamily="34" charset="0"/>
               </a:rPr>
               <a:t>. </a:t>
             </a:r>
             <a:r>
               <a:rPr lang="en-US" altLang="en-US" sz="6000" dirty="0">
-                <a:solidFill>
-                  <a:schemeClr val="bg1"/>
-                </a:solidFill>
                 <a:latin typeface="Helvetica" panose="020B0604020202020204" pitchFamily="34" charset="0"/>
               </a:rPr>
               <a:t>Those that are closed</a:t>
@@ -4970,9 +4969,6 @@
           <a:p>
             <a:r>
               <a:rPr lang="en-US" altLang="en-US" sz="6000" dirty="0">
-                <a:solidFill>
-                  <a:schemeClr val="bg1"/>
-                </a:solidFill>
                 <a:latin typeface="Helvetica" panose="020B0604020202020204" pitchFamily="34" charset="0"/>
               </a:rPr>
               <a:t>and/or not considered cheap are discarded. The top</a:t>
@@ -4981,9 +4977,6 @@
           <a:p>
             <a:r>
               <a:rPr lang="en-US" altLang="en-US" sz="6000" dirty="0">
-                <a:solidFill>
-                  <a:schemeClr val="bg1"/>
-                </a:solidFill>
                 <a:latin typeface="Helvetica" panose="020B0604020202020204" pitchFamily="34" charset="0"/>
               </a:rPr>
               <a:t>three options will be returned as the results, with their</a:t>
@@ -4992,9 +4985,6 @@
           <a:p>
             <a:r>
               <a:rPr lang="en-US" altLang="en-US" sz="6000" dirty="0">
-                <a:solidFill>
-                  <a:schemeClr val="bg1"/>
-                </a:solidFill>
                 <a:latin typeface="Helvetica" panose="020B0604020202020204" pitchFamily="34" charset="0"/>
               </a:rPr>
               <a:t>store hours and distance shown.</a:t>
@@ -5002,18 +4992,12 @@
           </a:p>
           <a:p>
             <a:endParaRPr lang="en-US" altLang="en-US" sz="6000" dirty="0">
-              <a:solidFill>
-                <a:schemeClr val="bg1"/>
-              </a:solidFill>
               <a:latin typeface="Helvetica" panose="020B0604020202020204" pitchFamily="34" charset="0"/>
             </a:endParaRPr>
           </a:p>
           <a:p>
             <a:r>
               <a:rPr lang="en-US" altLang="en-US" sz="6000" dirty="0">
-                <a:solidFill>
-                  <a:schemeClr val="bg1"/>
-                </a:solidFill>
                 <a:latin typeface="Helvetica" panose="020B0604020202020204" pitchFamily="34" charset="0"/>
               </a:rPr>
               <a:t>This Smart score is calculated by considering the following:</a:t>
@@ -5026,9 +5010,6 @@
             </a:pPr>
             <a:r>
               <a:rPr lang="en-US" altLang="en-US" sz="6000" dirty="0">
-                <a:solidFill>
-                  <a:schemeClr val="bg1"/>
-                </a:solidFill>
                 <a:latin typeface="Helvetica" panose="020B0604020202020204" pitchFamily="34" charset="0"/>
               </a:rPr>
               <a:t>Price</a:t>
@@ -5041,9 +5022,6 @@
             </a:pPr>
             <a:r>
               <a:rPr lang="en-US" altLang="en-US" sz="6000" dirty="0">
-                <a:solidFill>
-                  <a:schemeClr val="bg1"/>
-                </a:solidFill>
                 <a:latin typeface="Helvetica" panose="020B0604020202020204" pitchFamily="34" charset="0"/>
               </a:rPr>
               <a:t>Number of Reviews</a:t>
@@ -5056,9 +5034,6 @@
             </a:pPr>
             <a:r>
               <a:rPr lang="en-US" altLang="en-US" sz="6000" dirty="0">
-                <a:solidFill>
-                  <a:schemeClr val="bg1"/>
-                </a:solidFill>
                 <a:latin typeface="Helvetica" panose="020B0604020202020204" pitchFamily="34" charset="0"/>
               </a:rPr>
               <a:t>Rating</a:t>
@@ -5071,9 +5046,6 @@
             </a:pPr>
             <a:r>
               <a:rPr lang="en-US" altLang="en-US" sz="6000" dirty="0">
-                <a:solidFill>
-                  <a:schemeClr val="bg1"/>
-                </a:solidFill>
                 <a:latin typeface="Helvetica" panose="020B0604020202020204" pitchFamily="34" charset="0"/>
               </a:rPr>
               <a:t>Distance</a:t>
@@ -5081,28 +5053,19 @@
           </a:p>
           <a:p>
             <a:endParaRPr lang="en-US" altLang="en-US" sz="6000" dirty="0">
-              <a:solidFill>
-                <a:schemeClr val="bg1"/>
-              </a:solidFill>
               <a:latin typeface="Helvetica" panose="020B0604020202020204" pitchFamily="34" charset="0"/>
             </a:endParaRPr>
           </a:p>
           <a:p>
             <a:r>
               <a:rPr lang="en-US" altLang="en-US" sz="6000" b="1" dirty="0">
-                <a:solidFill>
-                  <a:schemeClr val="bg1"/>
-                </a:solidFill>
-                <a:latin typeface="Helvetica" panose="020B0604020202020204" pitchFamily="34" charset="0"/>
-              </a:rPr>
-              <a:t>rating*(number of reviews/(price level + 1))</a:t>
+                <a:latin typeface="Helvetica" panose="020B0604020202020204" pitchFamily="34" charset="0"/>
+              </a:rPr>
+              <a:t>(rating*number of reviews/(price level + 1))</a:t>
             </a:r>
           </a:p>
           <a:p>
             <a:endParaRPr lang="en-US" altLang="en-US" sz="6000" dirty="0">
-              <a:solidFill>
-                <a:schemeClr val="bg1"/>
-              </a:solidFill>
               <a:latin typeface="Helvetica" panose="020B0604020202020204" pitchFamily="34" charset="0"/>
             </a:endParaRPr>
           </a:p>
@@ -5152,8 +5115,8 @@
         </p:nvSpPr>
         <p:spPr>
           <a:xfrm>
-            <a:off x="36178640" y="23277927"/>
-            <a:ext cx="6553910" cy="3785652"/>
+            <a:off x="34974435" y="24384001"/>
+            <a:ext cx="8667757" cy="7848302"/>
           </a:xfrm>
           <a:prstGeom prst="rect">
             <a:avLst/>
@@ -5167,7 +5130,10 @@
           <a:lstStyle/>
           <a:p>
             <a:r>
-              <a:rPr lang="en-US" sz="6000" dirty="0"/>
+              <a:rPr lang="en-US" sz="3600" dirty="0">
+                <a:latin typeface="Helvetica" panose="020B0604020202020204" pitchFamily="34" charset="0"/>
+                <a:cs typeface="Helvetica" panose="020B0604020202020204" pitchFamily="34" charset="0"/>
+              </a:rPr>
               <a:t>References:</a:t>
             </a:r>
           </a:p>
@@ -5177,10 +5143,16 @@
               <a:buChar char="•"/>
             </a:pPr>
             <a:r>
-              <a:rPr lang="en-US" sz="6000" dirty="0" err="1"/>
+              <a:rPr lang="en-US" sz="3600" dirty="0" err="1">
+                <a:latin typeface="Helvetica" panose="020B0604020202020204" pitchFamily="34" charset="0"/>
+                <a:cs typeface="Helvetica" panose="020B0604020202020204" pitchFamily="34" charset="0"/>
+              </a:rPr>
               <a:t>Youtube</a:t>
             </a:r>
-            <a:endParaRPr lang="en-US" sz="6000" dirty="0"/>
+            <a:endParaRPr lang="en-US" sz="3600" dirty="0">
+              <a:latin typeface="Helvetica" panose="020B0604020202020204" pitchFamily="34" charset="0"/>
+              <a:cs typeface="Helvetica" panose="020B0604020202020204" pitchFamily="34" charset="0"/>
+            </a:endParaRPr>
           </a:p>
           <a:p>
             <a:pPr marL="857250" indent="-857250">
@@ -5188,7 +5160,10 @@
               <a:buChar char="•"/>
             </a:pPr>
             <a:r>
-              <a:rPr lang="en-US" sz="6000" dirty="0"/>
+              <a:rPr lang="en-US" sz="3600" dirty="0">
+                <a:latin typeface="Helvetica" panose="020B0604020202020204" pitchFamily="34" charset="0"/>
+                <a:cs typeface="Helvetica" panose="020B0604020202020204" pitchFamily="34" charset="0"/>
+              </a:rPr>
               <a:t>Stack Overflow</a:t>
             </a:r>
           </a:p>
@@ -5198,14 +5173,199 @@
               <a:buChar char="•"/>
             </a:pPr>
             <a:r>
-              <a:rPr lang="en-US" sz="6000" dirty="0"/>
+              <a:rPr lang="en-US" sz="3600" dirty="0">
+                <a:latin typeface="Helvetica" panose="020B0604020202020204" pitchFamily="34" charset="0"/>
+                <a:cs typeface="Helvetica" panose="020B0604020202020204" pitchFamily="34" charset="0"/>
+              </a:rPr>
               <a:t>Google’s </a:t>
             </a:r>
             <a:r>
-              <a:rPr lang="en-US" sz="6000" dirty="0" err="1"/>
+              <a:rPr lang="en-US" sz="3600" dirty="0" err="1">
+                <a:latin typeface="Helvetica" panose="020B0604020202020204" pitchFamily="34" charset="0"/>
+                <a:cs typeface="Helvetica" panose="020B0604020202020204" pitchFamily="34" charset="0"/>
+              </a:rPr>
               <a:t>Github</a:t>
             </a:r>
-            <a:endParaRPr lang="en-US" sz="6000" dirty="0"/>
+            <a:endParaRPr lang="en-US" sz="3600" dirty="0">
+              <a:latin typeface="Helvetica" panose="020B0604020202020204" pitchFamily="34" charset="0"/>
+              <a:cs typeface="Helvetica" panose="020B0604020202020204" pitchFamily="34" charset="0"/>
+            </a:endParaRPr>
+          </a:p>
+          <a:p>
+            <a:pPr marL="857250" indent="-857250">
+              <a:buFont typeface="Arial" panose="020B0604020202020204" pitchFamily="34" charset="0"/>
+              <a:buChar char="•"/>
+            </a:pPr>
+            <a:r>
+              <a:rPr lang="fr-FR" sz="3600" dirty="0">
+                <a:latin typeface="Helvetica" panose="020B0604020202020204" pitchFamily="34" charset="0"/>
+                <a:cs typeface="Helvetica" panose="020B0604020202020204" pitchFamily="34" charset="0"/>
+              </a:rPr>
+              <a:t>https://www.youtube.com/</a:t>
+            </a:r>
+            <a:br>
+              <a:rPr lang="fr-FR" sz="3600" dirty="0">
+                <a:latin typeface="Helvetica" panose="020B0604020202020204" pitchFamily="34" charset="0"/>
+                <a:cs typeface="Helvetica" panose="020B0604020202020204" pitchFamily="34" charset="0"/>
+              </a:rPr>
+            </a:br>
+            <a:r>
+              <a:rPr lang="fr-FR" sz="3600" dirty="0" err="1">
+                <a:latin typeface="Helvetica" panose="020B0604020202020204" pitchFamily="34" charset="0"/>
+                <a:cs typeface="Helvetica" panose="020B0604020202020204" pitchFamily="34" charset="0"/>
+              </a:rPr>
+              <a:t>watch?v</a:t>
+            </a:r>
+            <a:r>
+              <a:rPr lang="fr-FR" sz="3600" dirty="0">
+                <a:latin typeface="Helvetica" panose="020B0604020202020204" pitchFamily="34" charset="0"/>
+                <a:cs typeface="Helvetica" panose="020B0604020202020204" pitchFamily="34" charset="0"/>
+              </a:rPr>
+              <a:t>=qkSmuquMueA  </a:t>
+            </a:r>
+          </a:p>
+          <a:p>
+            <a:pPr marL="857250" indent="-857250">
+              <a:buFont typeface="Arial" panose="020B0604020202020204" pitchFamily="34" charset="0"/>
+              <a:buChar char="•"/>
+            </a:pPr>
+            <a:r>
+              <a:rPr lang="fr-FR" sz="3600" dirty="0">
+                <a:latin typeface="Helvetica" panose="020B0604020202020204" pitchFamily="34" charset="0"/>
+                <a:cs typeface="Helvetica" panose="020B0604020202020204" pitchFamily="34" charset="0"/>
+              </a:rPr>
+              <a:t>https://stackoverflow.com/</a:t>
+            </a:r>
+            <a:br>
+              <a:rPr lang="fr-FR" sz="3600" dirty="0">
+                <a:latin typeface="Helvetica" panose="020B0604020202020204" pitchFamily="34" charset="0"/>
+                <a:cs typeface="Helvetica" panose="020B0604020202020204" pitchFamily="34" charset="0"/>
+              </a:rPr>
+            </a:br>
+            <a:r>
+              <a:rPr lang="fr-FR" sz="3600" dirty="0">
+                <a:latin typeface="Helvetica" panose="020B0604020202020204" pitchFamily="34" charset="0"/>
+                <a:cs typeface="Helvetica" panose="020B0604020202020204" pitchFamily="34" charset="0"/>
+              </a:rPr>
+              <a:t>questions/613183/how-do-i-sort-a-</a:t>
+            </a:r>
+            <a:br>
+              <a:rPr lang="fr-FR" sz="3600" dirty="0">
+                <a:latin typeface="Helvetica" panose="020B0604020202020204" pitchFamily="34" charset="0"/>
+                <a:cs typeface="Helvetica" panose="020B0604020202020204" pitchFamily="34" charset="0"/>
+              </a:rPr>
+            </a:br>
+            <a:r>
+              <a:rPr lang="fr-FR" sz="3600" dirty="0" err="1">
+                <a:latin typeface="Helvetica" panose="020B0604020202020204" pitchFamily="34" charset="0"/>
+                <a:cs typeface="Helvetica" panose="020B0604020202020204" pitchFamily="34" charset="0"/>
+              </a:rPr>
+              <a:t>dictionary</a:t>
+            </a:r>
+            <a:r>
+              <a:rPr lang="fr-FR" sz="3600" dirty="0">
+                <a:latin typeface="Helvetica" panose="020B0604020202020204" pitchFamily="34" charset="0"/>
+                <a:cs typeface="Helvetica" panose="020B0604020202020204" pitchFamily="34" charset="0"/>
+              </a:rPr>
+              <a:t>-by-value  </a:t>
+            </a:r>
+          </a:p>
+          <a:p>
+            <a:pPr marL="857250" indent="-857250">
+              <a:buFont typeface="Arial" panose="020B0604020202020204" pitchFamily="34" charset="0"/>
+              <a:buChar char="•"/>
+            </a:pPr>
+            <a:r>
+              <a:rPr lang="fr-FR" sz="3600" dirty="0">
+                <a:latin typeface="Helvetica" panose="020B0604020202020204" pitchFamily="34" charset="0"/>
+                <a:cs typeface="Helvetica" panose="020B0604020202020204" pitchFamily="34" charset="0"/>
+              </a:rPr>
+              <a:t>https://stackoverflow.com/questions/</a:t>
+            </a:r>
+            <a:br>
+              <a:rPr lang="fr-FR" sz="3600" dirty="0">
+                <a:latin typeface="Helvetica" panose="020B0604020202020204" pitchFamily="34" charset="0"/>
+                <a:cs typeface="Helvetica" panose="020B0604020202020204" pitchFamily="34" charset="0"/>
+              </a:rPr>
+            </a:br>
+            <a:r>
+              <a:rPr lang="fr-FR" sz="3600" dirty="0">
+                <a:latin typeface="Helvetica" panose="020B0604020202020204" pitchFamily="34" charset="0"/>
+                <a:cs typeface="Helvetica" panose="020B0604020202020204" pitchFamily="34" charset="0"/>
+              </a:rPr>
+              <a:t>50704611/</a:t>
+            </a:r>
+            <a:r>
+              <a:rPr lang="fr-FR" sz="3600" dirty="0" err="1">
+                <a:latin typeface="Helvetica" panose="020B0604020202020204" pitchFamily="34" charset="0"/>
+                <a:cs typeface="Helvetica" panose="020B0604020202020204" pitchFamily="34" charset="0"/>
+              </a:rPr>
+              <a:t>next</a:t>
+            </a:r>
+            <a:r>
+              <a:rPr lang="fr-FR" sz="3600" dirty="0">
+                <a:latin typeface="Helvetica" panose="020B0604020202020204" pitchFamily="34" charset="0"/>
+                <a:cs typeface="Helvetica" panose="020B0604020202020204" pitchFamily="34" charset="0"/>
+              </a:rPr>
+              <a:t>-page-</a:t>
+            </a:r>
+            <a:r>
+              <a:rPr lang="fr-FR" sz="3600" dirty="0" err="1">
+                <a:latin typeface="Helvetica" panose="020B0604020202020204" pitchFamily="34" charset="0"/>
+                <a:cs typeface="Helvetica" panose="020B0604020202020204" pitchFamily="34" charset="0"/>
+              </a:rPr>
+              <a:t>token</a:t>
+            </a:r>
+            <a:r>
+              <a:rPr lang="fr-FR" sz="3600" dirty="0">
+                <a:latin typeface="Helvetica" panose="020B0604020202020204" pitchFamily="34" charset="0"/>
+                <a:cs typeface="Helvetica" panose="020B0604020202020204" pitchFamily="34" charset="0"/>
+              </a:rPr>
+              <a:t>-google-</a:t>
+            </a:r>
+            <a:br>
+              <a:rPr lang="fr-FR" sz="3600" dirty="0">
+                <a:latin typeface="Helvetica" panose="020B0604020202020204" pitchFamily="34" charset="0"/>
+                <a:cs typeface="Helvetica" panose="020B0604020202020204" pitchFamily="34" charset="0"/>
+              </a:rPr>
+            </a:br>
+            <a:r>
+              <a:rPr lang="fr-FR" sz="3600" dirty="0">
+                <a:latin typeface="Helvetica" panose="020B0604020202020204" pitchFamily="34" charset="0"/>
+                <a:cs typeface="Helvetica" panose="020B0604020202020204" pitchFamily="34" charset="0"/>
+              </a:rPr>
+              <a:t>places </a:t>
+            </a:r>
+          </a:p>
+          <a:p>
+            <a:pPr marL="857250" indent="-857250">
+              <a:buFont typeface="Arial" panose="020B0604020202020204" pitchFamily="34" charset="0"/>
+              <a:buChar char="•"/>
+            </a:pPr>
+            <a:r>
+              <a:rPr lang="fr-FR" sz="3600" dirty="0">
+                <a:latin typeface="Helvetica" panose="020B0604020202020204" pitchFamily="34" charset="0"/>
+                <a:cs typeface="Helvetica" panose="020B0604020202020204" pitchFamily="34" charset="0"/>
+              </a:rPr>
+              <a:t>https://developers.google.com/places</a:t>
+            </a:r>
+            <a:br>
+              <a:rPr lang="fr-FR" sz="3600" dirty="0">
+                <a:latin typeface="Helvetica" panose="020B0604020202020204" pitchFamily="34" charset="0"/>
+                <a:cs typeface="Helvetica" panose="020B0604020202020204" pitchFamily="34" charset="0"/>
+              </a:rPr>
+            </a:br>
+            <a:r>
+              <a:rPr lang="fr-FR" sz="3600" dirty="0">
+                <a:latin typeface="Helvetica" panose="020B0604020202020204" pitchFamily="34" charset="0"/>
+                <a:cs typeface="Helvetica" panose="020B0604020202020204" pitchFamily="34" charset="0"/>
+              </a:rPr>
+              <a:t>/web-service/search</a:t>
+            </a:r>
+            <a:endParaRPr lang="en-US" sz="3600" dirty="0">
+              <a:latin typeface="Helvetica" panose="020B0604020202020204" pitchFamily="34" charset="0"/>
+              <a:cs typeface="Helvetica" panose="020B0604020202020204" pitchFamily="34" charset="0"/>
+            </a:endParaRPr>
           </a:p>
         </p:txBody>
       </p:sp>
@@ -5253,8 +5413,8 @@
         </p:nvSpPr>
         <p:spPr>
           <a:xfrm>
-            <a:off x="17655164" y="31470008"/>
-            <a:ext cx="11777583" cy="646331"/>
+            <a:off x="17982102" y="31406316"/>
+            <a:ext cx="9222396" cy="523220"/>
           </a:xfrm>
           <a:prstGeom prst="rect">
             <a:avLst/>
@@ -5268,10 +5428,9 @@
           <a:lstStyle/>
           <a:p>
             <a:r>
-              <a:rPr lang="en-US" sz="3600" dirty="0">
-                <a:solidFill>
-                  <a:schemeClr val="bg1"/>
-                </a:solidFill>
+              <a:rPr lang="en-US" sz="2800" dirty="0">
+                <a:latin typeface="Helvetica" panose="020B0604020202020204" pitchFamily="34" charset="0"/>
+                <a:cs typeface="Helvetica" panose="020B0604020202020204" pitchFamily="34" charset="0"/>
               </a:rPr>
               <a:t>Not an actual sample image. Just a visual representation</a:t>
             </a:r>
@@ -5370,9 +5529,6 @@
               <a:ln>
                 <a:noFill/>
               </a:ln>
-              <a:solidFill>
-                <a:schemeClr val="tx1"/>
-              </a:solidFill>
               <a:effectLst/>
               <a:latin typeface="Arial" charset="0"/>
             </a:endParaRPr>
@@ -5423,8 +5579,8 @@
         </p:nvSpPr>
         <p:spPr>
           <a:xfrm>
-            <a:off x="35280600" y="9533726"/>
-            <a:ext cx="10877673" cy="2862322"/>
+            <a:off x="35634861" y="17499431"/>
+            <a:ext cx="10877673" cy="2123658"/>
           </a:xfrm>
           <a:prstGeom prst="rect">
             <a:avLst/>
@@ -5438,7 +5594,10 @@
           <a:lstStyle/>
           <a:p>
             <a:r>
-              <a:rPr lang="en-US" sz="6000" dirty="0"/>
+              <a:rPr lang="en-US" sz="4400" dirty="0">
+                <a:latin typeface="Helvetica" panose="020B0604020202020204" pitchFamily="34" charset="0"/>
+                <a:cs typeface="Helvetica" panose="020B0604020202020204" pitchFamily="34" charset="0"/>
+              </a:rPr>
               <a:t>API’s:</a:t>
             </a:r>
           </a:p>
@@ -5448,7 +5607,10 @@
               <a:buChar char="•"/>
             </a:pPr>
             <a:r>
-              <a:rPr lang="en-US" sz="6000" dirty="0"/>
+              <a:rPr lang="en-US" sz="4400" dirty="0">
+                <a:latin typeface="Helvetica" panose="020B0604020202020204" pitchFamily="34" charset="0"/>
+                <a:cs typeface="Helvetica" panose="020B0604020202020204" pitchFamily="34" charset="0"/>
+              </a:rPr>
               <a:t>Google Places</a:t>
             </a:r>
           </a:p>
@@ -5458,10 +5620,608 @@
               <a:buChar char="•"/>
             </a:pPr>
             <a:r>
-              <a:rPr lang="en-US" sz="6000" dirty="0" err="1"/>
+              <a:rPr lang="en-US" sz="4400" dirty="0" err="1">
+                <a:latin typeface="Helvetica" panose="020B0604020202020204" pitchFamily="34" charset="0"/>
+                <a:cs typeface="Helvetica" panose="020B0604020202020204" pitchFamily="34" charset="0"/>
+              </a:rPr>
               <a:t>GeoLocate</a:t>
             </a:r>
-            <a:endParaRPr lang="en-US" sz="6000" dirty="0"/>
+            <a:endParaRPr lang="en-US" sz="4400" dirty="0">
+              <a:latin typeface="Helvetica" panose="020B0604020202020204" pitchFamily="34" charset="0"/>
+              <a:cs typeface="Helvetica" panose="020B0604020202020204" pitchFamily="34" charset="0"/>
+            </a:endParaRPr>
+          </a:p>
+        </p:txBody>
+      </p:sp>
+      <p:sp>
+        <p:nvSpPr>
+          <p:cNvPr id="4" name="TextBox 3">
+            <a:extLst>
+              <a:ext uri="{FF2B5EF4-FFF2-40B4-BE49-F238E27FC236}">
+                <a16:creationId xmlns:a16="http://schemas.microsoft.com/office/drawing/2014/main" id="{FE107523-344D-4CC6-99AE-552B1D7D0F47}"/>
+              </a:ext>
+            </a:extLst>
+          </p:cNvPr>
+          <p:cNvSpPr txBox="1"/>
+          <p:nvPr/>
+        </p:nvSpPr>
+        <p:spPr>
+          <a:xfrm>
+            <a:off x="875008" y="8259209"/>
+            <a:ext cx="8828058" cy="4093428"/>
+          </a:xfrm>
+          <a:prstGeom prst="rect">
+            <a:avLst/>
+          </a:prstGeom>
+          <a:noFill/>
+        </p:spPr>
+        <p:txBody>
+          <a:bodyPr wrap="none" rtlCol="0">
+            <a:spAutoFit/>
+          </a:bodyPr>
+          <a:lstStyle/>
+          <a:p>
+            <a:pPr algn="ctr"/>
+            <a:r>
+              <a:rPr lang="en-US" sz="4400" b="1" u="sng" dirty="0">
+                <a:latin typeface="Helvetica" panose="020B0604020202020204" pitchFamily="34" charset="0"/>
+                <a:cs typeface="Helvetica" panose="020B0604020202020204" pitchFamily="34" charset="0"/>
+              </a:rPr>
+              <a:t>Introduction</a:t>
+            </a:r>
+          </a:p>
+          <a:p>
+            <a:r>
+              <a:rPr lang="en-US" sz="3600" dirty="0">
+                <a:latin typeface="Helvetica" panose="020B0604020202020204" pitchFamily="34" charset="0"/>
+                <a:cs typeface="Helvetica" panose="020B0604020202020204" pitchFamily="34" charset="0"/>
+              </a:rPr>
+              <a:t>Google Maps usually presents restaurants</a:t>
+            </a:r>
+          </a:p>
+          <a:p>
+            <a:r>
+              <a:rPr lang="en-US" sz="3600" dirty="0">
+                <a:latin typeface="Helvetica" panose="020B0604020202020204" pitchFamily="34" charset="0"/>
+                <a:cs typeface="Helvetica" panose="020B0604020202020204" pitchFamily="34" charset="0"/>
+              </a:rPr>
+              <a:t>based on location. However, since many</a:t>
+            </a:r>
+          </a:p>
+          <a:p>
+            <a:r>
+              <a:rPr lang="en-US" sz="3600" dirty="0">
+                <a:latin typeface="Helvetica" panose="020B0604020202020204" pitchFamily="34" charset="0"/>
+                <a:cs typeface="Helvetica" panose="020B0604020202020204" pitchFamily="34" charset="0"/>
+              </a:rPr>
+              <a:t>restaurants may be close this may be</a:t>
+            </a:r>
+          </a:p>
+          <a:p>
+            <a:r>
+              <a:rPr lang="en-US" sz="3600" dirty="0">
+                <a:latin typeface="Helvetica" panose="020B0604020202020204" pitchFamily="34" charset="0"/>
+                <a:cs typeface="Helvetica" panose="020B0604020202020204" pitchFamily="34" charset="0"/>
+              </a:rPr>
+              <a:t>irrelevant. Instead, more people would</a:t>
+            </a:r>
+          </a:p>
+          <a:p>
+            <a:r>
+              <a:rPr lang="en-US" sz="3600" dirty="0">
+                <a:latin typeface="Helvetica" panose="020B0604020202020204" pitchFamily="34" charset="0"/>
+                <a:cs typeface="Helvetica" panose="020B0604020202020204" pitchFamily="34" charset="0"/>
+              </a:rPr>
+              <a:t>want the highest quality food for the best</a:t>
+            </a:r>
+          </a:p>
+          <a:p>
+            <a:r>
+              <a:rPr lang="en-US" sz="3600" dirty="0">
+                <a:latin typeface="Helvetica" panose="020B0604020202020204" pitchFamily="34" charset="0"/>
+                <a:cs typeface="Helvetica" panose="020B0604020202020204" pitchFamily="34" charset="0"/>
+              </a:rPr>
+              <a:t>price.</a:t>
+            </a:r>
+          </a:p>
+        </p:txBody>
+      </p:sp>
+      <p:sp>
+        <p:nvSpPr>
+          <p:cNvPr id="6" name="TextBox 5">
+            <a:extLst>
+              <a:ext uri="{FF2B5EF4-FFF2-40B4-BE49-F238E27FC236}">
+                <a16:creationId xmlns:a16="http://schemas.microsoft.com/office/drawing/2014/main" id="{1CA6971E-0BAC-451A-B0EC-A771D9D2C3A9}"/>
+              </a:ext>
+            </a:extLst>
+          </p:cNvPr>
+          <p:cNvSpPr txBox="1"/>
+          <p:nvPr/>
+        </p:nvSpPr>
+        <p:spPr>
+          <a:xfrm>
+            <a:off x="875008" y="12913560"/>
+            <a:ext cx="8999258" cy="11295400"/>
+          </a:xfrm>
+          <a:prstGeom prst="rect">
+            <a:avLst/>
+          </a:prstGeom>
+          <a:noFill/>
+        </p:spPr>
+        <p:txBody>
+          <a:bodyPr wrap="none" rtlCol="0">
+            <a:spAutoFit/>
+          </a:bodyPr>
+          <a:lstStyle/>
+          <a:p>
+            <a:pPr algn="ctr"/>
+            <a:r>
+              <a:rPr lang="en-US" sz="4400" b="1" u="sng" dirty="0">
+                <a:latin typeface="Helvetica" panose="020B0604020202020204" pitchFamily="34" charset="0"/>
+                <a:cs typeface="Helvetica" panose="020B0604020202020204" pitchFamily="34" charset="0"/>
+              </a:rPr>
+              <a:t>Methods</a:t>
+            </a:r>
+          </a:p>
+          <a:p>
+            <a:r>
+              <a:rPr lang="en-US" sz="3600" dirty="0">
+                <a:latin typeface="Helvetica" panose="020B0604020202020204" pitchFamily="34" charset="0"/>
+                <a:cs typeface="Helvetica" panose="020B0604020202020204" pitchFamily="34" charset="0"/>
+              </a:rPr>
+              <a:t>In order to accomplish this we used the</a:t>
+            </a:r>
+          </a:p>
+          <a:p>
+            <a:r>
+              <a:rPr lang="en-US" sz="3600" dirty="0">
+                <a:latin typeface="Helvetica" panose="020B0604020202020204" pitchFamily="34" charset="0"/>
+                <a:cs typeface="Helvetica" panose="020B0604020202020204" pitchFamily="34" charset="0"/>
+              </a:rPr>
+              <a:t>Google Maps API. This will get places</a:t>
+            </a:r>
+          </a:p>
+          <a:p>
+            <a:r>
+              <a:rPr lang="en-US" sz="3600" dirty="0">
+                <a:latin typeface="Helvetica" panose="020B0604020202020204" pitchFamily="34" charset="0"/>
+                <a:cs typeface="Helvetica" panose="020B0604020202020204" pitchFamily="34" charset="0"/>
+              </a:rPr>
+              <a:t>and their information requested from</a:t>
+            </a:r>
+          </a:p>
+          <a:p>
+            <a:r>
+              <a:rPr lang="en-US" sz="3600" dirty="0">
+                <a:latin typeface="Helvetica" panose="020B0604020202020204" pitchFamily="34" charset="0"/>
+                <a:cs typeface="Helvetica" panose="020B0604020202020204" pitchFamily="34" charset="0"/>
+              </a:rPr>
+              <a:t>Google servers based around the user’s</a:t>
+            </a:r>
+          </a:p>
+          <a:p>
+            <a:r>
+              <a:rPr lang="en-US" sz="3600" dirty="0">
+                <a:latin typeface="Helvetica" panose="020B0604020202020204" pitchFamily="34" charset="0"/>
+                <a:cs typeface="Helvetica" panose="020B0604020202020204" pitchFamily="34" charset="0"/>
+              </a:rPr>
+              <a:t>current position. We obviously filtered</a:t>
+            </a:r>
+          </a:p>
+          <a:p>
+            <a:r>
+              <a:rPr lang="en-US" sz="3600" dirty="0">
+                <a:latin typeface="Helvetica" panose="020B0604020202020204" pitchFamily="34" charset="0"/>
+                <a:cs typeface="Helvetica" panose="020B0604020202020204" pitchFamily="34" charset="0"/>
+              </a:rPr>
+              <a:t>this information to display only restaurants</a:t>
+            </a:r>
+          </a:p>
+          <a:p>
+            <a:r>
+              <a:rPr lang="en-US" sz="3600" dirty="0">
+                <a:latin typeface="Helvetica" panose="020B0604020202020204" pitchFamily="34" charset="0"/>
+                <a:cs typeface="Helvetica" panose="020B0604020202020204" pitchFamily="34" charset="0"/>
+              </a:rPr>
+              <a:t>within the radius specified by the user. We</a:t>
+            </a:r>
+          </a:p>
+          <a:p>
+            <a:r>
+              <a:rPr lang="en-US" sz="3600" dirty="0">
+                <a:latin typeface="Helvetica" panose="020B0604020202020204" pitchFamily="34" charset="0"/>
+                <a:cs typeface="Helvetica" panose="020B0604020202020204" pitchFamily="34" charset="0"/>
+              </a:rPr>
+              <a:t>are ranking them based on a score we</a:t>
+            </a:r>
+          </a:p>
+          <a:p>
+            <a:r>
+              <a:rPr lang="en-US" sz="3600" dirty="0">
+                <a:latin typeface="Helvetica" panose="020B0604020202020204" pitchFamily="34" charset="0"/>
+                <a:cs typeface="Helvetica" panose="020B0604020202020204" pitchFamily="34" charset="0"/>
+              </a:rPr>
+              <a:t>invented. This </a:t>
+            </a:r>
+            <a:r>
+              <a:rPr lang="en-US" sz="3600" b="1" dirty="0">
+                <a:latin typeface="Helvetica" panose="020B0604020202020204" pitchFamily="34" charset="0"/>
+                <a:cs typeface="Helvetica" panose="020B0604020202020204" pitchFamily="34" charset="0"/>
+              </a:rPr>
+              <a:t>score </a:t>
+            </a:r>
+            <a:r>
+              <a:rPr lang="en-US" sz="3600" dirty="0">
+                <a:latin typeface="Helvetica" panose="020B0604020202020204" pitchFamily="34" charset="0"/>
+                <a:cs typeface="Helvetica" panose="020B0604020202020204" pitchFamily="34" charset="0"/>
+              </a:rPr>
+              <a:t>is calculated by</a:t>
+            </a:r>
+          </a:p>
+          <a:p>
+            <a:r>
+              <a:rPr lang="en-US" sz="3600" dirty="0">
+                <a:latin typeface="Helvetica" panose="020B0604020202020204" pitchFamily="34" charset="0"/>
+                <a:cs typeface="Helvetica" panose="020B0604020202020204" pitchFamily="34" charset="0"/>
+              </a:rPr>
+              <a:t>multiplying the star rating times the</a:t>
+            </a:r>
+          </a:p>
+          <a:p>
+            <a:r>
+              <a:rPr lang="en-US" sz="3600" dirty="0">
+                <a:latin typeface="Helvetica" panose="020B0604020202020204" pitchFamily="34" charset="0"/>
+                <a:cs typeface="Helvetica" panose="020B0604020202020204" pitchFamily="34" charset="0"/>
+              </a:rPr>
+              <a:t>number of reviews divided by the price</a:t>
+            </a:r>
+          </a:p>
+          <a:p>
+            <a:r>
+              <a:rPr lang="en-US" sz="3600" dirty="0">
+                <a:latin typeface="Helvetica" panose="020B0604020202020204" pitchFamily="34" charset="0"/>
+                <a:cs typeface="Helvetica" panose="020B0604020202020204" pitchFamily="34" charset="0"/>
+              </a:rPr>
+              <a:t>level plus one. We used this to rank the</a:t>
+            </a:r>
+          </a:p>
+          <a:p>
+            <a:r>
+              <a:rPr lang="en-US" sz="3600" dirty="0">
+                <a:latin typeface="Helvetica" panose="020B0604020202020204" pitchFamily="34" charset="0"/>
+                <a:cs typeface="Helvetica" panose="020B0604020202020204" pitchFamily="34" charset="0"/>
+              </a:rPr>
+              <a:t>restaurants by the score. This helps people</a:t>
+            </a:r>
+          </a:p>
+          <a:p>
+            <a:r>
+              <a:rPr lang="en-US" sz="3600" dirty="0">
+                <a:latin typeface="Helvetica" panose="020B0604020202020204" pitchFamily="34" charset="0"/>
+                <a:cs typeface="Helvetica" panose="020B0604020202020204" pitchFamily="34" charset="0"/>
+              </a:rPr>
+              <a:t>find the best food for proportionally good</a:t>
+            </a:r>
+          </a:p>
+          <a:p>
+            <a:r>
+              <a:rPr lang="en-US" sz="3600" dirty="0">
+                <a:latin typeface="Helvetica" panose="020B0604020202020204" pitchFamily="34" charset="0"/>
+                <a:cs typeface="Helvetica" panose="020B0604020202020204" pitchFamily="34" charset="0"/>
+              </a:rPr>
+              <a:t>price. The plus one is there because the</a:t>
+            </a:r>
+          </a:p>
+          <a:p>
+            <a:r>
+              <a:rPr lang="en-US" sz="3600" dirty="0">
+                <a:latin typeface="Helvetica" panose="020B0604020202020204" pitchFamily="34" charset="0"/>
+                <a:cs typeface="Helvetica" panose="020B0604020202020204" pitchFamily="34" charset="0"/>
+              </a:rPr>
+              <a:t>price level can be anywhere from zero to</a:t>
+            </a:r>
+          </a:p>
+          <a:p>
+            <a:r>
+              <a:rPr lang="en-US" sz="3600" dirty="0">
+                <a:latin typeface="Helvetica" panose="020B0604020202020204" pitchFamily="34" charset="0"/>
+                <a:cs typeface="Helvetica" panose="020B0604020202020204" pitchFamily="34" charset="0"/>
+              </a:rPr>
+              <a:t>four and we had to ensure there would be</a:t>
+            </a:r>
+          </a:p>
+          <a:p>
+            <a:r>
+              <a:rPr lang="en-US" sz="3600" dirty="0">
+                <a:latin typeface="Helvetica" panose="020B0604020202020204" pitchFamily="34" charset="0"/>
+                <a:cs typeface="Helvetica" panose="020B0604020202020204" pitchFamily="34" charset="0"/>
+              </a:rPr>
+              <a:t>no divide by zero issues.</a:t>
+            </a:r>
+          </a:p>
+          <a:p>
+            <a:endParaRPr lang="en-US" sz="3600" dirty="0">
+              <a:latin typeface="Helvetica" panose="020B0604020202020204" pitchFamily="34" charset="0"/>
+              <a:cs typeface="Helvetica" panose="020B0604020202020204" pitchFamily="34" charset="0"/>
+            </a:endParaRPr>
+          </a:p>
+        </p:txBody>
+      </p:sp>
+      <p:sp>
+        <p:nvSpPr>
+          <p:cNvPr id="8" name="TextBox 7">
+            <a:extLst>
+              <a:ext uri="{FF2B5EF4-FFF2-40B4-BE49-F238E27FC236}">
+                <a16:creationId xmlns:a16="http://schemas.microsoft.com/office/drawing/2014/main" id="{10E0A40C-4888-4D02-87CC-021F953A68D2}"/>
+              </a:ext>
+            </a:extLst>
+          </p:cNvPr>
+          <p:cNvSpPr txBox="1"/>
+          <p:nvPr/>
+        </p:nvSpPr>
+        <p:spPr>
+          <a:xfrm>
+            <a:off x="875008" y="24769884"/>
+            <a:ext cx="8392041" cy="6309420"/>
+          </a:xfrm>
+          <a:prstGeom prst="rect">
+            <a:avLst/>
+          </a:prstGeom>
+          <a:noFill/>
+        </p:spPr>
+        <p:txBody>
+          <a:bodyPr wrap="none" rtlCol="0">
+            <a:spAutoFit/>
+          </a:bodyPr>
+          <a:lstStyle/>
+          <a:p>
+            <a:pPr algn="ctr"/>
+            <a:r>
+              <a:rPr lang="en-US" sz="4400" b="1" u="sng" dirty="0">
+                <a:latin typeface="Helvetica" panose="020B0604020202020204" pitchFamily="34" charset="0"/>
+                <a:cs typeface="Helvetica" panose="020B0604020202020204" pitchFamily="34" charset="0"/>
+              </a:rPr>
+              <a:t>Results</a:t>
+            </a:r>
+          </a:p>
+          <a:p>
+            <a:r>
+              <a:rPr lang="en-US" sz="3600" dirty="0">
+                <a:latin typeface="Helvetica" panose="020B0604020202020204" pitchFamily="34" charset="0"/>
+                <a:cs typeface="Helvetica" panose="020B0604020202020204" pitchFamily="34" charset="0"/>
+              </a:rPr>
+              <a:t>Overall, the program worked to all of its</a:t>
+            </a:r>
+          </a:p>
+          <a:p>
+            <a:r>
+              <a:rPr lang="en-US" sz="3600" dirty="0">
+                <a:latin typeface="Helvetica" panose="020B0604020202020204" pitchFamily="34" charset="0"/>
+                <a:cs typeface="Helvetica" panose="020B0604020202020204" pitchFamily="34" charset="0"/>
+              </a:rPr>
+              <a:t>desired specifications. However, one</a:t>
+            </a:r>
+          </a:p>
+          <a:p>
+            <a:r>
+              <a:rPr lang="en-US" sz="3600" dirty="0">
+                <a:latin typeface="Helvetica" panose="020B0604020202020204" pitchFamily="34" charset="0"/>
+                <a:cs typeface="Helvetica" panose="020B0604020202020204" pitchFamily="34" charset="0"/>
+              </a:rPr>
+              <a:t>thing we learned was the Google Map</a:t>
+            </a:r>
+          </a:p>
+          <a:p>
+            <a:r>
+              <a:rPr lang="en-US" sz="3600" dirty="0">
+                <a:latin typeface="Helvetica" panose="020B0604020202020204" pitchFamily="34" charset="0"/>
+                <a:cs typeface="Helvetica" panose="020B0604020202020204" pitchFamily="34" charset="0"/>
+              </a:rPr>
+              <a:t>API would not give us more than sixty</a:t>
+            </a:r>
+          </a:p>
+          <a:p>
+            <a:r>
+              <a:rPr lang="en-US" sz="3600" dirty="0">
+                <a:latin typeface="Helvetica" panose="020B0604020202020204" pitchFamily="34" charset="0"/>
+                <a:cs typeface="Helvetica" panose="020B0604020202020204" pitchFamily="34" charset="0"/>
+              </a:rPr>
+              <a:t>results. We even had some extra time</a:t>
+            </a:r>
+          </a:p>
+          <a:p>
+            <a:r>
+              <a:rPr lang="en-US" sz="3600" dirty="0">
+                <a:latin typeface="Helvetica" panose="020B0604020202020204" pitchFamily="34" charset="0"/>
+                <a:cs typeface="Helvetica" panose="020B0604020202020204" pitchFamily="34" charset="0"/>
+              </a:rPr>
+              <a:t>to add a new feature that helped the</a:t>
+            </a:r>
+          </a:p>
+          <a:p>
+            <a:r>
+              <a:rPr lang="en-US" sz="3600" dirty="0">
+                <a:latin typeface="Helvetica" panose="020B0604020202020204" pitchFamily="34" charset="0"/>
+                <a:cs typeface="Helvetica" panose="020B0604020202020204" pitchFamily="34" charset="0"/>
+              </a:rPr>
+              <a:t>user find free food. However, by</a:t>
+            </a:r>
+          </a:p>
+          <a:p>
+            <a:r>
+              <a:rPr lang="en-US" sz="3600" dirty="0">
+                <a:latin typeface="Helvetica" panose="020B0604020202020204" pitchFamily="34" charset="0"/>
+                <a:cs typeface="Helvetica" panose="020B0604020202020204" pitchFamily="34" charset="0"/>
+              </a:rPr>
+              <a:t>running the program it was realized</a:t>
+            </a:r>
+          </a:p>
+          <a:p>
+            <a:r>
+              <a:rPr lang="en-US" sz="3600" dirty="0">
+                <a:latin typeface="Helvetica" panose="020B0604020202020204" pitchFamily="34" charset="0"/>
+                <a:cs typeface="Helvetica" panose="020B0604020202020204" pitchFamily="34" charset="0"/>
+              </a:rPr>
+              <a:t>the presence of free food was </a:t>
+            </a:r>
+            <a:r>
+              <a:rPr lang="en-US" sz="3600" i="1" dirty="0">
+                <a:latin typeface="Helvetica" panose="020B0604020202020204" pitchFamily="34" charset="0"/>
+                <a:cs typeface="Helvetica" panose="020B0604020202020204" pitchFamily="34" charset="0"/>
+              </a:rPr>
+              <a:t>extremely</a:t>
+            </a:r>
+          </a:p>
+          <a:p>
+            <a:r>
+              <a:rPr lang="en-US" sz="3600" dirty="0">
+                <a:latin typeface="Helvetica" panose="020B0604020202020204" pitchFamily="34" charset="0"/>
+                <a:cs typeface="Helvetica" panose="020B0604020202020204" pitchFamily="34" charset="0"/>
+              </a:rPr>
+              <a:t>rare.</a:t>
+            </a:r>
+          </a:p>
+        </p:txBody>
+      </p:sp>
+      <p:sp>
+        <p:nvSpPr>
+          <p:cNvPr id="9" name="TextBox 8">
+            <a:extLst>
+              <a:ext uri="{FF2B5EF4-FFF2-40B4-BE49-F238E27FC236}">
+                <a16:creationId xmlns:a16="http://schemas.microsoft.com/office/drawing/2014/main" id="{0C0F8221-3E50-4B1D-ADC6-7E48E320A8DA}"/>
+              </a:ext>
+            </a:extLst>
+          </p:cNvPr>
+          <p:cNvSpPr txBox="1"/>
+          <p:nvPr/>
+        </p:nvSpPr>
+        <p:spPr>
+          <a:xfrm>
+            <a:off x="35717453" y="9236820"/>
+            <a:ext cx="6486071" cy="5509200"/>
+          </a:xfrm>
+          <a:prstGeom prst="rect">
+            <a:avLst/>
+          </a:prstGeom>
+          <a:noFill/>
+        </p:spPr>
+        <p:txBody>
+          <a:bodyPr wrap="none" rtlCol="0">
+            <a:spAutoFit/>
+          </a:bodyPr>
+          <a:lstStyle/>
+          <a:p>
+            <a:pPr eaLnBrk="1" hangingPunct="1"/>
+            <a:r>
+              <a:rPr lang="en-US" altLang="ko-KR" sz="4400" b="1" u="sng" dirty="0">
+                <a:latin typeface="Helvetica" panose="020B0604020202020204" pitchFamily="34" charset="0"/>
+                <a:cs typeface="Helvetica" panose="020B0604020202020204" pitchFamily="34" charset="0"/>
+              </a:rPr>
+              <a:t>Authors:</a:t>
+            </a:r>
+            <a:r>
+              <a:rPr lang="en-US" altLang="ko-KR" sz="4400" dirty="0">
+                <a:latin typeface="Helvetica" panose="020B0604020202020204" pitchFamily="34" charset="0"/>
+                <a:cs typeface="Helvetica" panose="020B0604020202020204" pitchFamily="34" charset="0"/>
+              </a:rPr>
+              <a:t> David Ulriksen,</a:t>
+            </a:r>
+          </a:p>
+          <a:p>
+            <a:pPr eaLnBrk="1" hangingPunct="1"/>
+            <a:r>
+              <a:rPr lang="en-US" sz="4400" dirty="0">
+                <a:latin typeface="Helvetica" panose="020B0604020202020204" pitchFamily="34" charset="0"/>
+                <a:cs typeface="Helvetica" panose="020B0604020202020204" pitchFamily="34" charset="0"/>
+              </a:rPr>
+              <a:t>Gregory </a:t>
+            </a:r>
+            <a:r>
+              <a:rPr lang="en-US" sz="4400" dirty="0" err="1">
+                <a:latin typeface="Helvetica" panose="020B0604020202020204" pitchFamily="34" charset="0"/>
+                <a:cs typeface="Helvetica" panose="020B0604020202020204" pitchFamily="34" charset="0"/>
+              </a:rPr>
+              <a:t>Albarian</a:t>
+            </a:r>
+            <a:r>
+              <a:rPr lang="en-US" sz="4400" dirty="0">
+                <a:latin typeface="Helvetica" panose="020B0604020202020204" pitchFamily="34" charset="0"/>
+                <a:cs typeface="Helvetica" panose="020B0604020202020204" pitchFamily="34" charset="0"/>
+              </a:rPr>
+              <a:t>,</a:t>
+            </a:r>
+          </a:p>
+          <a:p>
+            <a:pPr eaLnBrk="1" hangingPunct="1"/>
+            <a:r>
+              <a:rPr lang="en-US" sz="4400" dirty="0">
+                <a:latin typeface="Helvetica" panose="020B0604020202020204" pitchFamily="34" charset="0"/>
+                <a:cs typeface="Helvetica" panose="020B0604020202020204" pitchFamily="34" charset="0"/>
+              </a:rPr>
+              <a:t>Alex </a:t>
+            </a:r>
+            <a:r>
+              <a:rPr lang="en-US" sz="4400" dirty="0" err="1">
+                <a:latin typeface="Helvetica" panose="020B0604020202020204" pitchFamily="34" charset="0"/>
+                <a:cs typeface="Helvetica" panose="020B0604020202020204" pitchFamily="34" charset="0"/>
+              </a:rPr>
+              <a:t>Vajiac</a:t>
+            </a:r>
+            <a:endParaRPr lang="en-US" sz="4400" dirty="0">
+              <a:latin typeface="Helvetica" panose="020B0604020202020204" pitchFamily="34" charset="0"/>
+              <a:cs typeface="Helvetica" panose="020B0604020202020204" pitchFamily="34" charset="0"/>
+            </a:endParaRPr>
+          </a:p>
+          <a:p>
+            <a:pPr eaLnBrk="1" hangingPunct="1"/>
+            <a:endParaRPr lang="en-US" sz="4400" dirty="0">
+              <a:latin typeface="Helvetica" panose="020B0604020202020204" pitchFamily="34" charset="0"/>
+              <a:cs typeface="Helvetica" panose="020B0604020202020204" pitchFamily="34" charset="0"/>
+            </a:endParaRPr>
+          </a:p>
+          <a:p>
+            <a:pPr eaLnBrk="1" hangingPunct="1"/>
+            <a:r>
+              <a:rPr lang="en-US" sz="4400" b="1" u="sng" dirty="0">
+                <a:latin typeface="Helvetica" panose="020B0604020202020204" pitchFamily="34" charset="0"/>
+                <a:cs typeface="Helvetica" panose="020B0604020202020204" pitchFamily="34" charset="0"/>
+              </a:rPr>
+              <a:t>Mentor:</a:t>
+            </a:r>
+            <a:r>
+              <a:rPr lang="en-US" sz="4400" dirty="0">
+                <a:latin typeface="Helvetica" panose="020B0604020202020204" pitchFamily="34" charset="0"/>
+                <a:cs typeface="Helvetica" panose="020B0604020202020204" pitchFamily="34" charset="0"/>
+              </a:rPr>
+              <a:t> Michael Fahy</a:t>
+            </a:r>
+          </a:p>
+          <a:p>
+            <a:pPr eaLnBrk="1" hangingPunct="1"/>
+            <a:endParaRPr lang="en-US" altLang="ko-KR" sz="4400" dirty="0">
+              <a:latin typeface="Helvetica" panose="020B0604020202020204" pitchFamily="34" charset="0"/>
+              <a:cs typeface="Helvetica" panose="020B0604020202020204" pitchFamily="34" charset="0"/>
+            </a:endParaRPr>
+          </a:p>
+          <a:p>
+            <a:pPr eaLnBrk="1" hangingPunct="1"/>
+            <a:r>
+              <a:rPr lang="en-US" altLang="ko-KR" sz="4400" b="1" u="sng" dirty="0">
+                <a:latin typeface="Helvetica" panose="020B0604020202020204" pitchFamily="34" charset="0"/>
+                <a:cs typeface="Helvetica" panose="020B0604020202020204" pitchFamily="34" charset="0"/>
+              </a:rPr>
+              <a:t>Class:</a:t>
+            </a:r>
+            <a:r>
+              <a:rPr lang="en-US" altLang="ko-KR" sz="4400" dirty="0">
+                <a:latin typeface="Helvetica" panose="020B0604020202020204" pitchFamily="34" charset="0"/>
+                <a:cs typeface="Helvetica" panose="020B0604020202020204" pitchFamily="34" charset="0"/>
+              </a:rPr>
+              <a:t> CPSC 353 </a:t>
+            </a:r>
+          </a:p>
+          <a:p>
+            <a:endParaRPr lang="en-US" sz="4400" dirty="0"/>
           </a:p>
         </p:txBody>
       </p:sp>
@@ -6598,6 +7358,12 @@
 </file>
 
 <file path=customXml/item1.xml><?xml version="1.0" encoding="utf-8"?>
+<p:properties xmlns:p="http://schemas.microsoft.com/office/2006/metadata/properties" xmlns:xsi="http://www.w3.org/2001/XMLSchema-instance" xmlns:pc="http://schemas.microsoft.com/office/infopath/2007/PartnerControls">
+  <documentManagement/>
+</p:properties>
+</file>
+
+<file path=customXml/item2.xml><?xml version="1.0" encoding="utf-8"?>
 <ct:contentTypeSchema xmlns:ct="http://schemas.microsoft.com/office/2006/metadata/contentType" xmlns:ma="http://schemas.microsoft.com/office/2006/metadata/properties/metaAttributes" ct:_="" ma:_="" ma:contentTypeName="Document" ma:contentTypeID="0x010100777056209E8FFF4685C0AF68BDB357A2" ma:contentTypeVersion="0" ma:contentTypeDescription="Create a new document." ma:contentTypeScope="" ma:versionID="f7f5bf2467878f947055fdabaa29e364">
   <xsd:schema xmlns:xsd="http://www.w3.org/2001/XMLSchema" xmlns:p="http://schemas.microsoft.com/office/2006/metadata/properties" targetNamespace="http://schemas.microsoft.com/office/2006/metadata/properties" ma:root="true" ma:fieldsID="4aeb20c0e3442673af7ee10786458764">
     <xsd:element name="properties">
@@ -6646,13 +7412,16 @@
 </ct:contentTypeSchema>
 </file>
 
-<file path=customXml/item2.xml><?xml version="1.0" encoding="utf-8"?>
-<p:properties xmlns:p="http://schemas.microsoft.com/office/2006/metadata/properties" xmlns:xsi="http://www.w3.org/2001/XMLSchema-instance" xmlns:pc="http://schemas.microsoft.com/office/infopath/2007/PartnerControls">
-  <documentManagement/>
-</p:properties>
+<file path=customXml/itemProps1.xml><?xml version="1.0" encoding="utf-8"?>
+<ds:datastoreItem xmlns:ds="http://schemas.openxmlformats.org/officeDocument/2006/customXml" ds:itemID="{DE13717B-C4D3-4759-8643-E5ECCC61D64F}">
+  <ds:schemaRefs>
+    <ds:schemaRef ds:uri="http://schemas.microsoft.com/office/2006/metadata/properties"/>
+    <ds:schemaRef ds:uri="http://schemas.microsoft.com/office/infopath/2007/PartnerControls"/>
+  </ds:schemaRefs>
+</ds:datastoreItem>
 </file>
 
-<file path=customXml/itemProps1.xml><?xml version="1.0" encoding="utf-8"?>
+<file path=customXml/itemProps2.xml><?xml version="1.0" encoding="utf-8"?>
 <ds:datastoreItem xmlns:ds="http://schemas.openxmlformats.org/officeDocument/2006/customXml" ds:itemID="{FA9992D9-B332-4519-A0D9-258E8B83E375}">
   <ds:schemaRefs>
     <ds:schemaRef ds:uri="http://schemas.microsoft.com/office/2006/metadata/contentType"/>
@@ -6665,13 +7434,4 @@
     <ds:schemaRef ds:uri="http://schemas.microsoft.com/office/internal/2005/internalDocumentation"/>
   </ds:schemaRefs>
 </ds:datastoreItem>
-</file>
-
-<file path=customXml/itemProps2.xml><?xml version="1.0" encoding="utf-8"?>
-<ds:datastoreItem xmlns:ds="http://schemas.openxmlformats.org/officeDocument/2006/customXml" ds:itemID="{DE13717B-C4D3-4759-8643-E5ECCC61D64F}">
-  <ds:schemaRefs>
-    <ds:schemaRef ds:uri="http://schemas.microsoft.com/office/2006/metadata/properties"/>
-    <ds:schemaRef ds:uri="http://schemas.microsoft.com/office/infopath/2007/PartnerControls"/>
-  </ds:schemaRefs>
-</ds:datastoreItem>
 </file>
</xml_diff>